<commit_message>
Update Confusion Matrix + Oversample for loop
</commit_message>
<xml_diff>
--- a/Half-Point_Presentation.pptx
+++ b/Half-Point_Presentation.pptx
@@ -6713,10 +6713,10 @@
       </p:pic>
       <p:pic>
         <p:nvPicPr>
-          <p:cNvPr id="10" name="Imagem 9">
+          <p:cNvPr id="9" name="Imagem 8">
             <a:extLst>
               <a:ext uri="{FF2B5EF4-FFF2-40B4-BE49-F238E27FC236}">
-                <a16:creationId xmlns:a16="http://schemas.microsoft.com/office/drawing/2014/main" id="{DF28F47C-56AA-42D5-98A7-8250ADD12AB8}"/>
+                <a16:creationId xmlns:a16="http://schemas.microsoft.com/office/drawing/2014/main" id="{87DA12BE-0585-4973-8FA9-CCED735471AC}"/>
               </a:ext>
             </a:extLst>
           </p:cNvPr>
@@ -6733,8 +6733,8 @@
         </p:blipFill>
         <p:spPr>
           <a:xfrm>
-            <a:off x="1038705" y="1294485"/>
-            <a:ext cx="3472783" cy="3594848"/>
+            <a:off x="675184" y="1294485"/>
+            <a:ext cx="3602736" cy="3583641"/>
           </a:xfrm>
           <a:prstGeom prst="rect">
             <a:avLst/>
@@ -17877,6 +17877,41 @@
           </a:p>
           <a:p>
             <a:pPr marL="285750" indent="-285750"/>
+            <a:r>
+              <a:rPr lang="pt-PT" dirty="0"/>
+              <a:t>F1-Score</a:t>
+            </a:r>
+          </a:p>
+          <a:p>
+            <a:pPr marL="285750" indent="-285750"/>
+            <a:r>
+              <a:rPr lang="pt-PT" dirty="0" err="1"/>
+              <a:t>Recall</a:t>
+            </a:r>
+            <a:endParaRPr lang="pt-PT" dirty="0"/>
+          </a:p>
+          <a:p>
+            <a:pPr marL="285750" indent="-285750"/>
+            <a:r>
+              <a:rPr lang="pt-PT" dirty="0" err="1"/>
+              <a:t>Classification</a:t>
+            </a:r>
+            <a:r>
+              <a:rPr lang="pt-PT" dirty="0"/>
+              <a:t> </a:t>
+            </a:r>
+            <a:r>
+              <a:rPr lang="pt-PT" dirty="0" err="1"/>
+              <a:t>Report</a:t>
+            </a:r>
+            <a:endParaRPr lang="pt-PT" dirty="0"/>
+          </a:p>
+          <a:p>
+            <a:pPr marL="285750" indent="-285750"/>
+            <a:endParaRPr lang="pt-PT" dirty="0"/>
+          </a:p>
+          <a:p>
+            <a:pPr marL="285750" indent="-285750"/>
             <a:endParaRPr dirty="0"/>
           </a:p>
         </p:txBody>
@@ -18043,8 +18078,8 @@
         </p:blipFill>
         <p:spPr>
           <a:xfrm>
-            <a:off x="3907145" y="1485085"/>
-            <a:ext cx="5055320" cy="2482612"/>
+            <a:off x="4336675" y="1696022"/>
+            <a:ext cx="4625789" cy="2271674"/>
           </a:xfrm>
           <a:prstGeom prst="rect">
             <a:avLst/>
@@ -18053,10 +18088,10 @@
       </p:pic>
       <p:pic>
         <p:nvPicPr>
-          <p:cNvPr id="7" name="Imagem 6">
+          <p:cNvPr id="6" name="Imagem 5">
             <a:extLst>
               <a:ext uri="{FF2B5EF4-FFF2-40B4-BE49-F238E27FC236}">
-                <a16:creationId xmlns:a16="http://schemas.microsoft.com/office/drawing/2014/main" id="{F189B77E-0056-4004-B060-6DE4BBFA5278}"/>
+                <a16:creationId xmlns:a16="http://schemas.microsoft.com/office/drawing/2014/main" id="{F28BCCCE-A748-46E1-A69B-293178BEC513}"/>
               </a:ext>
             </a:extLst>
           </p:cNvPr>
@@ -18073,8 +18108,8 @@
         </p:blipFill>
         <p:spPr>
           <a:xfrm>
-            <a:off x="342900" y="1485085"/>
-            <a:ext cx="3052482" cy="3159775"/>
+            <a:off x="468846" y="1294485"/>
+            <a:ext cx="3726091" cy="3463433"/>
           </a:xfrm>
           <a:prstGeom prst="rect">
             <a:avLst/>

</xml_diff>